<commit_message>
updated repo to mapo from laptop
</commit_message>
<xml_diff>
--- a/dissertation/preport/presentation.pptx
+++ b/dissertation/preport/presentation.pptx
@@ -841,7 +841,7 @@
             <a:fld id="{B61BEF0D-F0BB-DE4B-95CE-6DB70DBA9567}" type="datetimeFigureOut">
               <a:rPr lang="en-US" dirty="0"/>
               <a:pPr/>
-              <a:t>2/11/19</a:t>
+              <a:t>6/10/19</a:t>
             </a:fld>
             <a:endParaRPr lang="en-US" dirty="0"/>
           </a:p>
@@ -1089,7 +1089,7 @@
             <a:fld id="{B61BEF0D-F0BB-DE4B-95CE-6DB70DBA9567}" type="datetimeFigureOut">
               <a:rPr lang="en-US" dirty="0"/>
               <a:pPr/>
-              <a:t>2/11/19</a:t>
+              <a:t>6/10/19</a:t>
             </a:fld>
             <a:endParaRPr lang="en-US" dirty="0"/>
           </a:p>
@@ -1400,7 +1400,7 @@
             <a:fld id="{B61BEF0D-F0BB-DE4B-95CE-6DB70DBA9567}" type="datetimeFigureOut">
               <a:rPr lang="en-US" dirty="0"/>
               <a:pPr/>
-              <a:t>2/11/19</a:t>
+              <a:t>6/10/19</a:t>
             </a:fld>
             <a:endParaRPr lang="en-US" dirty="0"/>
           </a:p>
@@ -1738,7 +1738,7 @@
             <a:fld id="{B61BEF0D-F0BB-DE4B-95CE-6DB70DBA9567}" type="datetimeFigureOut">
               <a:rPr lang="en-US" dirty="0"/>
               <a:pPr/>
-              <a:t>2/11/19</a:t>
+              <a:t>6/10/19</a:t>
             </a:fld>
             <a:endParaRPr lang="en-US" dirty="0"/>
           </a:p>
@@ -2049,7 +2049,7 @@
             <a:fld id="{B61BEF0D-F0BB-DE4B-95CE-6DB70DBA9567}" type="datetimeFigureOut">
               <a:rPr lang="en-US" dirty="0"/>
               <a:pPr/>
-              <a:t>2/11/19</a:t>
+              <a:t>6/10/19</a:t>
             </a:fld>
             <a:endParaRPr lang="en-US" dirty="0"/>
           </a:p>
@@ -2439,7 +2439,7 @@
             <a:fld id="{B61BEF0D-F0BB-DE4B-95CE-6DB70DBA9567}" type="datetimeFigureOut">
               <a:rPr lang="en-US" dirty="0"/>
               <a:pPr/>
-              <a:t>2/11/19</a:t>
+              <a:t>6/10/19</a:t>
             </a:fld>
             <a:endParaRPr lang="en-US" dirty="0"/>
           </a:p>
@@ -2605,7 +2605,7 @@
           <a:p>
             <a:fld id="{55C6B4A9-1611-4792-9094-5F34BCA07E0B}" type="datetimeFigureOut">
               <a:rPr lang="en-US" dirty="0"/>
-              <a:t>2/11/19</a:t>
+              <a:t>6/10/19</a:t>
             </a:fld>
             <a:endParaRPr lang="en-US" dirty="0"/>
           </a:p>
@@ -2781,7 +2781,7 @@
             <a:fld id="{B61BEF0D-F0BB-DE4B-95CE-6DB70DBA9567}" type="datetimeFigureOut">
               <a:rPr lang="en-US" dirty="0"/>
               <a:pPr/>
-              <a:t>2/11/19</a:t>
+              <a:t>6/10/19</a:t>
             </a:fld>
             <a:endParaRPr lang="en-US" dirty="0"/>
           </a:p>
@@ -2954,7 +2954,7 @@
             <a:fld id="{B61BEF0D-F0BB-DE4B-95CE-6DB70DBA9567}" type="datetimeFigureOut">
               <a:rPr lang="en-US" dirty="0"/>
               <a:pPr/>
-              <a:t>2/11/19</a:t>
+              <a:t>6/10/19</a:t>
             </a:fld>
             <a:endParaRPr lang="en-US" dirty="0"/>
           </a:p>
@@ -3198,7 +3198,7 @@
             <a:fld id="{B61BEF0D-F0BB-DE4B-95CE-6DB70DBA9567}" type="datetimeFigureOut">
               <a:rPr lang="en-US" dirty="0"/>
               <a:pPr/>
-              <a:t>2/11/19</a:t>
+              <a:t>6/10/19</a:t>
             </a:fld>
             <a:endParaRPr lang="en-US" dirty="0"/>
           </a:p>
@@ -3426,7 +3426,7 @@
           <a:p>
             <a:fld id="{EB712588-04B1-427B-82EE-E8DB90309F08}" type="datetimeFigureOut">
               <a:rPr lang="en-US" dirty="0"/>
-              <a:t>2/11/19</a:t>
+              <a:t>6/10/19</a:t>
             </a:fld>
             <a:endParaRPr lang="en-US" dirty="0"/>
           </a:p>
@@ -3796,7 +3796,7 @@
             <a:fld id="{B61BEF0D-F0BB-DE4B-95CE-6DB70DBA9567}" type="datetimeFigureOut">
               <a:rPr lang="en-US" dirty="0"/>
               <a:pPr/>
-              <a:t>2/11/19</a:t>
+              <a:t>6/10/19</a:t>
             </a:fld>
             <a:endParaRPr lang="en-US" dirty="0"/>
           </a:p>
@@ -3916,7 +3916,7 @@
             <a:fld id="{B61BEF0D-F0BB-DE4B-95CE-6DB70DBA9567}" type="datetimeFigureOut">
               <a:rPr lang="en-US" dirty="0"/>
               <a:pPr/>
-              <a:t>2/11/19</a:t>
+              <a:t>6/10/19</a:t>
             </a:fld>
             <a:endParaRPr lang="en-US" dirty="0"/>
           </a:p>
@@ -4008,7 +4008,7 @@
             <a:fld id="{B61BEF0D-F0BB-DE4B-95CE-6DB70DBA9567}" type="datetimeFigureOut">
               <a:rPr lang="en-US" dirty="0"/>
               <a:pPr/>
-              <a:t>2/11/19</a:t>
+              <a:t>6/10/19</a:t>
             </a:fld>
             <a:endParaRPr lang="en-US" dirty="0"/>
           </a:p>
@@ -4259,7 +4259,7 @@
           <a:p>
             <a:fld id="{42A54C80-263E-416B-A8E0-580EDEADCBDC}" type="datetimeFigureOut">
               <a:rPr lang="en-US" dirty="0"/>
-              <a:t>2/11/19</a:t>
+              <a:t>6/10/19</a:t>
             </a:fld>
             <a:endParaRPr lang="en-US" dirty="0"/>
           </a:p>
@@ -4518,7 +4518,7 @@
             <a:fld id="{B61BEF0D-F0BB-DE4B-95CE-6DB70DBA9567}" type="datetimeFigureOut">
               <a:rPr lang="en-US" dirty="0"/>
               <a:pPr/>
-              <a:t>2/11/19</a:t>
+              <a:t>6/10/19</a:t>
             </a:fld>
             <a:endParaRPr lang="en-US" dirty="0"/>
           </a:p>
@@ -5258,7 +5258,7 @@
             <a:fld id="{B61BEF0D-F0BB-DE4B-95CE-6DB70DBA9567}" type="datetimeFigureOut">
               <a:rPr lang="en-US" dirty="0"/>
               <a:pPr/>
-              <a:t>2/11/19</a:t>
+              <a:t>6/10/19</a:t>
             </a:fld>
             <a:endParaRPr lang="en-US" dirty="0"/>
           </a:p>

</xml_diff>